<commit_message>
Significant rewrite of lab on relays
</commit_message>
<xml_diff>
--- a/electronics_manual/relays/relay_pinout.pptx
+++ b/electronics_manual/relays/relay_pinout.pptx
@@ -197,7 +197,7 @@
           <a:p>
             <a:fld id="{0F47002E-2458-4D49-9BB8-A963926F9AC5}" type="datetimeFigureOut">
               <a:rPr lang="en-US" smtClean="0"/>
-              <a:t>10/26/2016</a:t>
+              <a:t>10/28/2017</a:t>
             </a:fld>
             <a:endParaRPr lang="en-US"/>
           </a:p>
@@ -680,7 +680,7 @@
           <a:p>
             <a:fld id="{57B54EF2-E2FD-4516-8B23-7AC5F47B532A}" type="datetimeFigureOut">
               <a:rPr lang="en-US" smtClean="0"/>
-              <a:t>10/26/2016</a:t>
+              <a:t>10/28/2017</a:t>
             </a:fld>
             <a:endParaRPr lang="en-US"/>
           </a:p>
@@ -850,7 +850,7 @@
           <a:p>
             <a:fld id="{57B54EF2-E2FD-4516-8B23-7AC5F47B532A}" type="datetimeFigureOut">
               <a:rPr lang="en-US" smtClean="0"/>
-              <a:t>10/26/2016</a:t>
+              <a:t>10/28/2017</a:t>
             </a:fld>
             <a:endParaRPr lang="en-US"/>
           </a:p>
@@ -1030,7 +1030,7 @@
           <a:p>
             <a:fld id="{57B54EF2-E2FD-4516-8B23-7AC5F47B532A}" type="datetimeFigureOut">
               <a:rPr lang="en-US" smtClean="0"/>
-              <a:t>10/26/2016</a:t>
+              <a:t>10/28/2017</a:t>
             </a:fld>
             <a:endParaRPr lang="en-US"/>
           </a:p>
@@ -1200,7 +1200,7 @@
           <a:p>
             <a:fld id="{57B54EF2-E2FD-4516-8B23-7AC5F47B532A}" type="datetimeFigureOut">
               <a:rPr lang="en-US" smtClean="0"/>
-              <a:t>10/26/2016</a:t>
+              <a:t>10/28/2017</a:t>
             </a:fld>
             <a:endParaRPr lang="en-US"/>
           </a:p>
@@ -1446,7 +1446,7 @@
           <a:p>
             <a:fld id="{57B54EF2-E2FD-4516-8B23-7AC5F47B532A}" type="datetimeFigureOut">
               <a:rPr lang="en-US" smtClean="0"/>
-              <a:t>10/26/2016</a:t>
+              <a:t>10/28/2017</a:t>
             </a:fld>
             <a:endParaRPr lang="en-US"/>
           </a:p>
@@ -1678,7 +1678,7 @@
           <a:p>
             <a:fld id="{57B54EF2-E2FD-4516-8B23-7AC5F47B532A}" type="datetimeFigureOut">
               <a:rPr lang="en-US" smtClean="0"/>
-              <a:t>10/26/2016</a:t>
+              <a:t>10/28/2017</a:t>
             </a:fld>
             <a:endParaRPr lang="en-US"/>
           </a:p>
@@ -2045,7 +2045,7 @@
           <a:p>
             <a:fld id="{57B54EF2-E2FD-4516-8B23-7AC5F47B532A}" type="datetimeFigureOut">
               <a:rPr lang="en-US" smtClean="0"/>
-              <a:t>10/26/2016</a:t>
+              <a:t>10/28/2017</a:t>
             </a:fld>
             <a:endParaRPr lang="en-US"/>
           </a:p>
@@ -2163,7 +2163,7 @@
           <a:p>
             <a:fld id="{57B54EF2-E2FD-4516-8B23-7AC5F47B532A}" type="datetimeFigureOut">
               <a:rPr lang="en-US" smtClean="0"/>
-              <a:t>10/26/2016</a:t>
+              <a:t>10/28/2017</a:t>
             </a:fld>
             <a:endParaRPr lang="en-US"/>
           </a:p>
@@ -2258,7 +2258,7 @@
           <a:p>
             <a:fld id="{57B54EF2-E2FD-4516-8B23-7AC5F47B532A}" type="datetimeFigureOut">
               <a:rPr lang="en-US" smtClean="0"/>
-              <a:t>10/26/2016</a:t>
+              <a:t>10/28/2017</a:t>
             </a:fld>
             <a:endParaRPr lang="en-US"/>
           </a:p>
@@ -2535,7 +2535,7 @@
           <a:p>
             <a:fld id="{57B54EF2-E2FD-4516-8B23-7AC5F47B532A}" type="datetimeFigureOut">
               <a:rPr lang="en-US" smtClean="0"/>
-              <a:t>10/26/2016</a:t>
+              <a:t>10/28/2017</a:t>
             </a:fld>
             <a:endParaRPr lang="en-US"/>
           </a:p>
@@ -2788,7 +2788,7 @@
           <a:p>
             <a:fld id="{57B54EF2-E2FD-4516-8B23-7AC5F47B532A}" type="datetimeFigureOut">
               <a:rPr lang="en-US" smtClean="0"/>
-              <a:t>10/26/2016</a:t>
+              <a:t>10/28/2017</a:t>
             </a:fld>
             <a:endParaRPr lang="en-US"/>
           </a:p>
@@ -3001,7 +3001,7 @@
           <a:p>
             <a:fld id="{57B54EF2-E2FD-4516-8B23-7AC5F47B532A}" type="datetimeFigureOut">
               <a:rPr lang="en-US" smtClean="0"/>
-              <a:t>10/26/2016</a:t>
+              <a:t>10/28/2017</a:t>
             </a:fld>
             <a:endParaRPr lang="en-US"/>
           </a:p>
@@ -4605,6 +4605,306 @@
           </p:txBody>
         </p:sp>
       </p:grpSp>
+      <p:sp>
+        <p:nvSpPr>
+          <p:cNvPr id="30" name="Left Brace 29"/>
+          <p:cNvSpPr/>
+          <p:nvPr/>
+        </p:nvSpPr>
+        <p:spPr>
+          <a:xfrm>
+            <a:off x="3308899" y="2668450"/>
+            <a:ext cx="161713" cy="926277"/>
+          </a:xfrm>
+          <a:prstGeom prst="leftBrace">
+            <a:avLst>
+              <a:gd name="adj1" fmla="val 48719"/>
+              <a:gd name="adj2" fmla="val 50000"/>
+            </a:avLst>
+          </a:prstGeom>
+          <a:ln w="12700">
+            <a:solidFill>
+              <a:schemeClr val="tx1"/>
+            </a:solidFill>
+          </a:ln>
+        </p:spPr>
+        <p:style>
+          <a:lnRef idx="1">
+            <a:schemeClr val="accent1"/>
+          </a:lnRef>
+          <a:fillRef idx="0">
+            <a:schemeClr val="accent1"/>
+          </a:fillRef>
+          <a:effectRef idx="0">
+            <a:schemeClr val="accent1"/>
+          </a:effectRef>
+          <a:fontRef idx="minor">
+            <a:schemeClr val="tx1"/>
+          </a:fontRef>
+        </p:style>
+        <p:txBody>
+          <a:bodyPr rtlCol="0" anchor="ctr"/>
+          <a:lstStyle/>
+          <a:p>
+            <a:pPr algn="ctr"/>
+            <a:endParaRPr lang="en-US"/>
+          </a:p>
+        </p:txBody>
+      </p:sp>
+      <p:sp>
+        <p:nvSpPr>
+          <p:cNvPr id="38" name="Left Brace 37"/>
+          <p:cNvSpPr/>
+          <p:nvPr/>
+        </p:nvSpPr>
+        <p:spPr>
+          <a:xfrm flipH="1">
+            <a:off x="4490621" y="2668450"/>
+            <a:ext cx="161713" cy="926277"/>
+          </a:xfrm>
+          <a:prstGeom prst="leftBrace">
+            <a:avLst>
+              <a:gd name="adj1" fmla="val 48719"/>
+              <a:gd name="adj2" fmla="val 50000"/>
+            </a:avLst>
+          </a:prstGeom>
+          <a:ln w="12700">
+            <a:solidFill>
+              <a:schemeClr val="tx1"/>
+            </a:solidFill>
+          </a:ln>
+        </p:spPr>
+        <p:style>
+          <a:lnRef idx="1">
+            <a:schemeClr val="accent1"/>
+          </a:lnRef>
+          <a:fillRef idx="0">
+            <a:schemeClr val="accent1"/>
+          </a:fillRef>
+          <a:effectRef idx="0">
+            <a:schemeClr val="accent1"/>
+          </a:effectRef>
+          <a:fontRef idx="minor">
+            <a:schemeClr val="tx1"/>
+          </a:fontRef>
+        </p:style>
+        <p:txBody>
+          <a:bodyPr rtlCol="0" anchor="ctr"/>
+          <a:lstStyle/>
+          <a:p>
+            <a:pPr algn="ctr"/>
+            <a:endParaRPr lang="en-US"/>
+          </a:p>
+        </p:txBody>
+      </p:sp>
+      <p:sp>
+        <p:nvSpPr>
+          <p:cNvPr id="40" name="Left Brace 39"/>
+          <p:cNvSpPr/>
+          <p:nvPr/>
+        </p:nvSpPr>
+        <p:spPr>
+          <a:xfrm>
+            <a:off x="3311869" y="2013116"/>
+            <a:ext cx="161713" cy="350772"/>
+          </a:xfrm>
+          <a:prstGeom prst="leftBrace">
+            <a:avLst>
+              <a:gd name="adj1" fmla="val 48719"/>
+              <a:gd name="adj2" fmla="val 50000"/>
+            </a:avLst>
+          </a:prstGeom>
+          <a:ln w="12700">
+            <a:solidFill>
+              <a:schemeClr val="tx1"/>
+            </a:solidFill>
+          </a:ln>
+        </p:spPr>
+        <p:style>
+          <a:lnRef idx="1">
+            <a:schemeClr val="accent1"/>
+          </a:lnRef>
+          <a:fillRef idx="0">
+            <a:schemeClr val="accent1"/>
+          </a:fillRef>
+          <a:effectRef idx="0">
+            <a:schemeClr val="accent1"/>
+          </a:effectRef>
+          <a:fontRef idx="minor">
+            <a:schemeClr val="tx1"/>
+          </a:fontRef>
+        </p:style>
+        <p:txBody>
+          <a:bodyPr rtlCol="0" anchor="ctr"/>
+          <a:lstStyle/>
+          <a:p>
+            <a:pPr algn="ctr"/>
+            <a:endParaRPr lang="en-US"/>
+          </a:p>
+        </p:txBody>
+      </p:sp>
+      <p:sp>
+        <p:nvSpPr>
+          <p:cNvPr id="41" name="chip label"/>
+          <p:cNvSpPr txBox="1"/>
+          <p:nvPr/>
+        </p:nvSpPr>
+        <p:spPr>
+          <a:xfrm>
+            <a:off x="2871808" y="2861179"/>
+            <a:ext cx="525594" cy="307777"/>
+          </a:xfrm>
+          <a:prstGeom prst="rect">
+            <a:avLst/>
+          </a:prstGeom>
+          <a:noFill/>
+        </p:spPr>
+        <p:txBody>
+          <a:bodyPr wrap="square" rtlCol="0">
+            <a:spAutoFit/>
+          </a:bodyPr>
+          <a:lstStyle/>
+          <a:p>
+            <a:pPr algn="ctr"/>
+            <a:r>
+              <a:rPr lang="en-US" sz="1400" dirty="0" smtClean="0"/>
+              <a:t>SW1</a:t>
+            </a:r>
+            <a:endParaRPr lang="en-US" sz="1400" dirty="0"/>
+          </a:p>
+        </p:txBody>
+      </p:sp>
+      <p:sp>
+        <p:nvSpPr>
+          <p:cNvPr id="42" name="chip label"/>
+          <p:cNvSpPr txBox="1"/>
+          <p:nvPr/>
+        </p:nvSpPr>
+        <p:spPr>
+          <a:xfrm>
+            <a:off x="4575261" y="2848699"/>
+            <a:ext cx="525594" cy="307777"/>
+          </a:xfrm>
+          <a:prstGeom prst="rect">
+            <a:avLst/>
+          </a:prstGeom>
+          <a:noFill/>
+        </p:spPr>
+        <p:txBody>
+          <a:bodyPr wrap="square" rtlCol="0">
+            <a:spAutoFit/>
+          </a:bodyPr>
+          <a:lstStyle/>
+          <a:p>
+            <a:pPr algn="ctr"/>
+            <a:r>
+              <a:rPr lang="en-US" sz="1400" dirty="0" smtClean="0"/>
+              <a:t>SW2</a:t>
+            </a:r>
+            <a:endParaRPr lang="en-US" sz="1400" dirty="0"/>
+          </a:p>
+        </p:txBody>
+      </p:sp>
+      <p:sp>
+        <p:nvSpPr>
+          <p:cNvPr id="43" name="chip label"/>
+          <p:cNvSpPr txBox="1"/>
+          <p:nvPr/>
+        </p:nvSpPr>
+        <p:spPr>
+          <a:xfrm>
+            <a:off x="2807619" y="2034613"/>
+            <a:ext cx="525594" cy="307777"/>
+          </a:xfrm>
+          <a:prstGeom prst="rect">
+            <a:avLst/>
+          </a:prstGeom>
+          <a:noFill/>
+        </p:spPr>
+        <p:txBody>
+          <a:bodyPr wrap="square" rtlCol="0">
+            <a:spAutoFit/>
+          </a:bodyPr>
+          <a:lstStyle/>
+          <a:p>
+            <a:pPr algn="ctr"/>
+            <a:r>
+              <a:rPr lang="en-US" sz="1400" dirty="0" smtClean="0"/>
+              <a:t>coil</a:t>
+            </a:r>
+            <a:endParaRPr lang="en-US" sz="1400" dirty="0"/>
+          </a:p>
+        </p:txBody>
+      </p:sp>
+      <p:sp>
+        <p:nvSpPr>
+          <p:cNvPr id="45" name="chip label"/>
+          <p:cNvSpPr txBox="1"/>
+          <p:nvPr/>
+        </p:nvSpPr>
+        <p:spPr>
+          <a:xfrm>
+            <a:off x="4732074" y="1973058"/>
+            <a:ext cx="1197695" cy="646331"/>
+          </a:xfrm>
+          <a:prstGeom prst="rect">
+            <a:avLst/>
+          </a:prstGeom>
+          <a:noFill/>
+        </p:spPr>
+        <p:txBody>
+          <a:bodyPr wrap="square" rtlCol="0">
+            <a:spAutoFit/>
+          </a:bodyPr>
+          <a:lstStyle/>
+          <a:p>
+            <a:r>
+              <a:rPr lang="en-US" sz="1200" i="1" dirty="0" smtClean="0"/>
+              <a:t>Missing pins </a:t>
+            </a:r>
+            <a:r>
+              <a:rPr lang="en-US" sz="1200" i="1" dirty="0" smtClean="0"/>
+              <a:t>counted in numbering</a:t>
+            </a:r>
+            <a:endParaRPr lang="en-US" sz="1200" i="1" dirty="0"/>
+          </a:p>
+        </p:txBody>
+      </p:sp>
+      <p:cxnSp>
+        <p:nvCxnSpPr>
+          <p:cNvPr id="33" name="Straight Connector 32"/>
+          <p:cNvCxnSpPr/>
+          <p:nvPr/>
+        </p:nvCxnSpPr>
+        <p:spPr>
+          <a:xfrm flipH="1">
+            <a:off x="4425668" y="2253334"/>
+            <a:ext cx="363207" cy="121933"/>
+          </a:xfrm>
+          <a:prstGeom prst="line">
+            <a:avLst/>
+          </a:prstGeom>
+          <a:ln w="12700">
+            <a:solidFill>
+              <a:schemeClr val="tx1"/>
+            </a:solidFill>
+          </a:ln>
+        </p:spPr>
+        <p:style>
+          <a:lnRef idx="1">
+            <a:schemeClr val="accent1"/>
+          </a:lnRef>
+          <a:fillRef idx="0">
+            <a:schemeClr val="accent1"/>
+          </a:fillRef>
+          <a:effectRef idx="0">
+            <a:schemeClr val="accent1"/>
+          </a:effectRef>
+          <a:fontRef idx="minor">
+            <a:schemeClr val="tx1"/>
+          </a:fontRef>
+        </p:style>
+      </p:cxnSp>
     </p:spTree>
     <p:extLst>
       <p:ext uri="{BB962C8B-B14F-4D97-AF65-F5344CB8AC3E}">

</xml_diff>